<commit_message>
slide on lossy compression
</commit_message>
<xml_diff>
--- a/docs/slides/12/12_compression.pptx
+++ b/docs/slides/12/12_compression.pptx
@@ -5,7 +5,7 @@
     <p:sldMasterId id="2147483648" r:id="rId1"/>
   </p:sldMasterIdLst>
   <p:notesMasterIdLst>
-    <p:notesMasterId r:id="rId41"/>
+    <p:notesMasterId r:id="rId42"/>
   </p:notesMasterIdLst>
   <p:sldIdLst>
     <p:sldId id="362" r:id="rId2"/>
@@ -46,7 +46,8 @@
     <p:sldId id="355" r:id="rId37"/>
     <p:sldId id="364" r:id="rId38"/>
     <p:sldId id="365" r:id="rId39"/>
-    <p:sldId id="363" r:id="rId40"/>
+    <p:sldId id="366" r:id="rId40"/>
+    <p:sldId id="363" r:id="rId41"/>
   </p:sldIdLst>
   <p:sldSz cx="13004800" cy="9753600"/>
   <p:notesSz cx="6858000" cy="9144000"/>
@@ -2194,7 +2195,7 @@
           </a:ln>
           <a:extLst>
             <a:ext uri="{C572A759-6A51-4108-AA02-DFA0A04FC94B}">
-              <ma14:wrappingTextBoxFlag xmlns="" xmlns:ma14="http://schemas.microsoft.com/office/mac/drawingml/2011/main" val="1"/>
+              <ma14:wrappingTextBoxFlag xmlns:ma14="http://schemas.microsoft.com/office/mac/drawingml/2011/main" xmlns="" val="1"/>
             </a:ext>
           </a:extLst>
         </p:spPr>
@@ -2233,7 +2234,7 @@
           </a:ln>
           <a:extLst>
             <a:ext uri="{C572A759-6A51-4108-AA02-DFA0A04FC94B}">
-              <ma14:wrappingTextBoxFlag xmlns="" xmlns:ma14="http://schemas.microsoft.com/office/mac/drawingml/2011/main" val="1"/>
+              <ma14:wrappingTextBoxFlag xmlns:ma14="http://schemas.microsoft.com/office/mac/drawingml/2011/main" xmlns="" val="1"/>
             </a:ext>
           </a:extLst>
         </p:spPr>
@@ -3216,11 +3217,7 @@
             <a:pPr algn="r"/>
             <a:r>
               <a:rPr lang="en-US" smtClean="0"/>
-              <a:t>Prof</a:t>
-            </a:r>
-            <a:r>
-              <a:rPr lang="en-US" smtClean="0"/>
-              <a:t>. </a:t>
+              <a:t>Prof. </a:t>
             </a:r>
             <a:r>
               <a:rPr lang="en-US" dirty="0" smtClean="0"/>
@@ -13448,8 +13445,12 @@
           <a:lstStyle/>
           <a:p>
             <a:r>
-              <a:rPr lang="en-US" dirty="0" smtClean="0"/>
-              <a:t>Homework</a:t>
+              <a:rPr lang="en-US" dirty="0" err="1" smtClean="0"/>
+              <a:t>Lossy</a:t>
+            </a:r>
+            <a:r>
+              <a:rPr lang="en-US" dirty="0" smtClean="0"/>
+              <a:t> Compression</a:t>
             </a:r>
             <a:endParaRPr lang="en-US" dirty="0"/>
           </a:p>
@@ -13465,42 +13466,96 @@
             <p:ph type="body" idx="1"/>
           </p:nvPr>
         </p:nvSpPr>
-        <p:spPr/>
+        <p:spPr>
+          <a:xfrm>
+            <a:off x="210553" y="2603499"/>
+            <a:ext cx="12603079" cy="6961605"/>
+          </a:xfrm>
+        </p:spPr>
         <p:txBody>
           <a:bodyPr/>
           <a:lstStyle/>
           <a:p>
             <a:r>
-              <a:rPr lang="en-US" dirty="0"/>
-              <a:t>Study Book Chapter </a:t>
-            </a:r>
-            <a:r>
-              <a:rPr lang="en-US" dirty="0" smtClean="0"/>
-              <a:t>5.5</a:t>
-            </a:r>
-          </a:p>
-          <a:p>
-            <a:r>
-              <a:rPr lang="en-US" dirty="0" smtClean="0"/>
-              <a:t>Study code in the </a:t>
+              <a:rPr lang="en-US" dirty="0" smtClean="0"/>
+              <a:t>So far, discussed </a:t>
             </a:r>
             <a:r>
               <a:rPr lang="en-US" i="1" dirty="0" smtClean="0"/>
-              <a:t>org.pg4200.les12</a:t>
-            </a:r>
-            <a:r>
-              <a:rPr lang="en-US" dirty="0" smtClean="0"/>
-              <a:t> package</a:t>
-            </a:r>
-          </a:p>
-          <a:p>
-            <a:r>
-              <a:rPr lang="en-US" dirty="0" smtClean="0"/>
-              <a:t>Do exercises in </a:t>
+              <a:t>Lossless Compression</a:t>
+            </a:r>
+          </a:p>
+          <a:p>
+            <a:pPr lvl="1"/>
+            <a:r>
+              <a:rPr lang="en-US" dirty="0" smtClean="0"/>
+              <a:t>from compressed data, always able to recover the original in full</a:t>
+            </a:r>
+          </a:p>
+          <a:p>
+            <a:r>
+              <a:rPr lang="en-US" dirty="0" smtClean="0"/>
+              <a:t>To compress even more, could use </a:t>
+            </a:r>
+            <a:r>
+              <a:rPr lang="en-US" i="1" dirty="0" err="1" smtClean="0"/>
+              <a:t>Lossy</a:t>
             </a:r>
             <a:r>
               <a:rPr lang="en-US" i="1" dirty="0" smtClean="0"/>
-              <a:t>exercises/ex12</a:t>
+              <a:t> Compression</a:t>
+            </a:r>
+          </a:p>
+          <a:p>
+            <a:pPr lvl="1"/>
+            <a:r>
+              <a:rPr lang="en-US" dirty="0" smtClean="0"/>
+              <a:t>lose some information when compress, so cannot recover the original</a:t>
+            </a:r>
+          </a:p>
+          <a:p>
+            <a:pPr lvl="1"/>
+            <a:r>
+              <a:rPr lang="en-US" dirty="0" smtClean="0"/>
+              <a:t>useful when a decrease in quality is acceptable</a:t>
+            </a:r>
+          </a:p>
+          <a:p>
+            <a:pPr lvl="1"/>
+            <a:r>
+              <a:rPr lang="en-US" dirty="0" err="1" smtClean="0"/>
+              <a:t>eg</a:t>
+            </a:r>
+            <a:r>
+              <a:rPr lang="en-US" dirty="0" smtClean="0"/>
+              <a:t>: images like </a:t>
+            </a:r>
+            <a:r>
+              <a:rPr lang="en-US" i="1" dirty="0" smtClean="0"/>
+              <a:t>JPEG</a:t>
+            </a:r>
+            <a:r>
+              <a:rPr lang="en-US" dirty="0" smtClean="0"/>
+              <a:t>, where quality is degraded to get smaller file size</a:t>
+            </a:r>
+          </a:p>
+          <a:p>
+            <a:pPr lvl="1"/>
+            <a:r>
+              <a:rPr lang="en-US" dirty="0" err="1" smtClean="0"/>
+              <a:t>eg</a:t>
+            </a:r>
+            <a:r>
+              <a:rPr lang="en-US" dirty="0" smtClean="0"/>
+              <a:t>: music formats like </a:t>
+            </a:r>
+            <a:r>
+              <a:rPr lang="en-US" i="1" dirty="0" smtClean="0"/>
+              <a:t>MP3</a:t>
+            </a:r>
+            <a:r>
+              <a:rPr lang="en-US" dirty="0" smtClean="0"/>
+              <a:t>, where removing some sound components that anyway would not be hearable by humans</a:t>
             </a:r>
           </a:p>
         </p:txBody>
@@ -13508,7 +13563,7 @@
     </p:spTree>
     <p:extLst>
       <p:ext uri="{BB962C8B-B14F-4D97-AF65-F5344CB8AC3E}">
-        <p14:creationId xmlns:p14="http://schemas.microsoft.com/office/powerpoint/2010/main" val="1528721822"/>
+        <p14:creationId xmlns:p14="http://schemas.microsoft.com/office/powerpoint/2010/main" val="1746748881"/>
       </p:ext>
     </p:extLst>
   </p:cSld>
@@ -13516,13 +13571,6 @@
     <a:masterClrMapping/>
   </p:clrMapOvr>
   <p:transition spd="med"/>
-  <p:timing>
-    <p:tnLst>
-      <p:par>
-        <p:cTn id="1" dur="indefinite" restart="never" nodeType="tmRoot"/>
-      </p:par>
-    </p:tnLst>
-  </p:timing>
 </p:sld>
 </file>
 
@@ -14512,6 +14560,117 @@
     <p:extLst>
       <p:ext uri="{BB962C8B-B14F-4D97-AF65-F5344CB8AC3E}">
         <p14:creationId xmlns:p14="http://schemas.microsoft.com/office/powerpoint/2010/main" val="582584620"/>
+      </p:ext>
+    </p:extLst>
+  </p:cSld>
+  <p:clrMapOvr>
+    <a:masterClrMapping/>
+  </p:clrMapOvr>
+  <p:transition spd="med"/>
+  <p:timing>
+    <p:tnLst>
+      <p:par>
+        <p:cTn id="1" dur="indefinite" restart="never" nodeType="tmRoot"/>
+      </p:par>
+    </p:tnLst>
+  </p:timing>
+</p:sld>
+</file>
+
+<file path=ppt/slides/slide40.xml><?xml version="1.0" encoding="utf-8"?>
+<p:sld xmlns:a="http://schemas.openxmlformats.org/drawingml/2006/main" xmlns:r="http://schemas.openxmlformats.org/officeDocument/2006/relationships" xmlns:p="http://schemas.openxmlformats.org/presentationml/2006/main">
+  <p:cSld>
+    <p:spTree>
+      <p:nvGrpSpPr>
+        <p:cNvPr id="1" name=""/>
+        <p:cNvGrpSpPr/>
+        <p:nvPr/>
+      </p:nvGrpSpPr>
+      <p:grpSpPr>
+        <a:xfrm>
+          <a:off x="0" y="0"/>
+          <a:ext cx="0" cy="0"/>
+          <a:chOff x="0" y="0"/>
+          <a:chExt cx="0" cy="0"/>
+        </a:xfrm>
+      </p:grpSpPr>
+      <p:sp>
+        <p:nvSpPr>
+          <p:cNvPr id="2" name="Title 1"/>
+          <p:cNvSpPr>
+            <a:spLocks noGrp="1"/>
+          </p:cNvSpPr>
+          <p:nvPr>
+            <p:ph type="title"/>
+          </p:nvPr>
+        </p:nvSpPr>
+        <p:spPr/>
+        <p:txBody>
+          <a:bodyPr/>
+          <a:lstStyle/>
+          <a:p>
+            <a:r>
+              <a:rPr lang="en-US" dirty="0" smtClean="0"/>
+              <a:t>Homework</a:t>
+            </a:r>
+            <a:endParaRPr lang="en-US" dirty="0"/>
+          </a:p>
+        </p:txBody>
+      </p:sp>
+      <p:sp>
+        <p:nvSpPr>
+          <p:cNvPr id="3" name="Text Placeholder 2"/>
+          <p:cNvSpPr>
+            <a:spLocks noGrp="1"/>
+          </p:cNvSpPr>
+          <p:nvPr>
+            <p:ph type="body" idx="1"/>
+          </p:nvPr>
+        </p:nvSpPr>
+        <p:spPr/>
+        <p:txBody>
+          <a:bodyPr/>
+          <a:lstStyle/>
+          <a:p>
+            <a:r>
+              <a:rPr lang="en-US" dirty="0"/>
+              <a:t>Study Book Chapter </a:t>
+            </a:r>
+            <a:r>
+              <a:rPr lang="en-US" dirty="0" smtClean="0"/>
+              <a:t>5.5</a:t>
+            </a:r>
+          </a:p>
+          <a:p>
+            <a:r>
+              <a:rPr lang="en-US" dirty="0" smtClean="0"/>
+              <a:t>Study code in the </a:t>
+            </a:r>
+            <a:r>
+              <a:rPr lang="en-US" i="1" dirty="0" smtClean="0"/>
+              <a:t>org.pg4200.les12</a:t>
+            </a:r>
+            <a:r>
+              <a:rPr lang="en-US" dirty="0" smtClean="0"/>
+              <a:t> package</a:t>
+            </a:r>
+          </a:p>
+          <a:p>
+            <a:r>
+              <a:rPr lang="en-US" dirty="0" smtClean="0"/>
+              <a:t>Do exercises in </a:t>
+            </a:r>
+            <a:r>
+              <a:rPr lang="en-US" i="1" dirty="0" smtClean="0"/>
+              <a:t>exercises/ex12</a:t>
+            </a:r>
+          </a:p>
+        </p:txBody>
+      </p:sp>
+    </p:spTree>
+    <p:extLst>
+      <p:ext uri="{BB962C8B-B14F-4D97-AF65-F5344CB8AC3E}">
+        <p14:creationId xmlns:p14="http://schemas.microsoft.com/office/powerpoint/2010/main" val="1528721822"/>
       </p:ext>
     </p:extLst>
   </p:cSld>

</xml_diff>